<commit_message>
Power Point presentation Update with pringScreen of test
</commit_message>
<xml_diff>
--- a/Project Starfighter 1.0.pptx
+++ b/Project Starfighter 1.0.pptx
@@ -4248,7 +4248,6 @@
               <a:rPr lang="en-US" dirty="0"/>
               <a:t> Test Code</a:t>
             </a:r>
-            <a:endParaRPr lang="en-US" dirty="0"/>
           </a:p>
         </p:txBody>
       </p:sp>
@@ -4494,7 +4493,6 @@
               <a:rPr lang="en-US" dirty="0"/>
               <a:t> Test Code</a:t>
             </a:r>
-            <a:endParaRPr lang="en-US" dirty="0"/>
           </a:p>
         </p:txBody>
       </p:sp>
@@ -4732,7 +4730,6 @@
               <a:rPr lang="en-US" dirty="0"/>
               <a:t> Test Code</a:t>
             </a:r>
-            <a:endParaRPr lang="en-US" dirty="0"/>
           </a:p>
         </p:txBody>
       </p:sp>
@@ -4971,7 +4968,6 @@
               <a:rPr lang="en-US" dirty="0"/>
               <a:t> Test Code</a:t>
             </a:r>
-            <a:endParaRPr lang="en-US" dirty="0"/>
           </a:p>
         </p:txBody>
       </p:sp>
@@ -5127,7 +5123,6 @@
               <a:rPr lang="en-US" sz="1800" dirty="0"/>
               <a:t>}</a:t>
             </a:r>
-            <a:endParaRPr lang="en-US" sz="1800" dirty="0"/>
           </a:p>
           <a:p>
             <a:pPr marL="0" indent="0">
@@ -5280,7 +5275,6 @@
               <a:rPr lang="en-US" dirty="0"/>
               <a:t>Test Code</a:t>
             </a:r>
-            <a:endParaRPr lang="en-US" dirty="0"/>
           </a:p>
         </p:txBody>
       </p:sp>
@@ -5465,7 +5459,6 @@
               <a:rPr lang="en-US" dirty="0"/>
               <a:t>Test Code</a:t>
             </a:r>
-            <a:endParaRPr lang="en-US" dirty="0"/>
           </a:p>
         </p:txBody>
       </p:sp>
@@ -5628,7 +5621,6 @@
               <a:rPr lang="en-US" dirty="0"/>
               <a:t>Test Code</a:t>
             </a:r>
-            <a:endParaRPr lang="en-US" dirty="0"/>
           </a:p>
         </p:txBody>
       </p:sp>
@@ -5863,7 +5855,6 @@
               <a:rPr lang="en-US" dirty="0"/>
               <a:t>Test Code</a:t>
             </a:r>
-            <a:endParaRPr lang="en-US" dirty="0"/>
           </a:p>
         </p:txBody>
       </p:sp>
@@ -6104,7 +6095,6 @@
               <a:rPr lang="en-US" dirty="0"/>
               <a:t>Test Code</a:t>
             </a:r>
-            <a:endParaRPr lang="en-US" dirty="0"/>
           </a:p>
         </p:txBody>
       </p:sp>
@@ -6273,7 +6263,6 @@
               <a:rPr lang="en-US" dirty="0"/>
               <a:t>Test Code</a:t>
             </a:r>
-            <a:endParaRPr lang="en-US" dirty="0"/>
           </a:p>
         </p:txBody>
       </p:sp>
@@ -6486,7 +6475,6 @@
               <a:rPr lang="en-US" dirty="0"/>
               <a:t>Test Code</a:t>
             </a:r>
-            <a:endParaRPr lang="en-US" dirty="0"/>
           </a:p>
         </p:txBody>
       </p:sp>
@@ -6786,7 +6774,6 @@
               <a:rPr lang="en-US" dirty="0"/>
               <a:t>Test Code</a:t>
             </a:r>
-            <a:endParaRPr lang="en-US" dirty="0"/>
           </a:p>
         </p:txBody>
       </p:sp>
@@ -7027,7 +7014,6 @@
               <a:rPr lang="en-US" dirty="0"/>
               <a:t>Test Code</a:t>
             </a:r>
-            <a:endParaRPr lang="en-US" dirty="0"/>
           </a:p>
         </p:txBody>
       </p:sp>
@@ -7268,7 +7254,6 @@
               <a:rPr lang="en-US" dirty="0"/>
               <a:t>Test Code</a:t>
             </a:r>
-            <a:endParaRPr lang="en-US" dirty="0"/>
           </a:p>
         </p:txBody>
       </p:sp>
@@ -7618,7 +7603,6 @@
               <a:rPr lang="en-US" dirty="0"/>
               <a:t>Test Code</a:t>
             </a:r>
-            <a:endParaRPr lang="en-US" dirty="0"/>
           </a:p>
         </p:txBody>
       </p:sp>
@@ -7907,35 +7891,44 @@
           <a:p>
             <a:r>
               <a:rPr lang="en-US" dirty="0" smtClean="0"/>
-              <a:t>BEHOLD THE DEMO!</a:t>
+              <a:t>Background </a:t>
+            </a:r>
+            <a:r>
+              <a:rPr lang="en-US" smtClean="0"/>
+              <a:t>and Player demo</a:t>
             </a:r>
             <a:endParaRPr lang="en-US" dirty="0"/>
           </a:p>
         </p:txBody>
       </p:sp>
-      <p:sp>
-        <p:nvSpPr>
-          <p:cNvPr id="3" name="Content Placeholder 2"/>
-          <p:cNvSpPr>
-            <a:spLocks noGrp="1"/>
-          </p:cNvSpPr>
+      <p:pic>
+        <p:nvPicPr>
+          <p:cNvPr id="9" name="Content Placeholder 8"/>
+          <p:cNvPicPr>
+            <a:picLocks noGrp="1" noChangeAspect="1"/>
+          </p:cNvPicPr>
           <p:nvPr>
             <p:ph idx="1"/>
           </p:nvPr>
-        </p:nvSpPr>
-        <p:spPr/>
-        <p:txBody>
-          <a:bodyPr/>
-          <a:lstStyle/>
-          <a:p>
-            <a:r>
-              <a:rPr lang="en-US" dirty="0" smtClean="0"/>
-              <a:t>Show demo here</a:t>
-            </a:r>
-            <a:endParaRPr lang="en-US" dirty="0"/>
-          </a:p>
-        </p:txBody>
-      </p:sp>
+        </p:nvPicPr>
+        <p:blipFill rotWithShape="1">
+          <a:blip r:embed="rId2" cstate="print">
+            <a:extLst>
+              <a:ext uri="{28A0092B-C50C-407E-A947-70E740481C1C}">
+                <a14:useLocalDpi xmlns:a14="http://schemas.microsoft.com/office/drawing/2010/main" val="0"/>
+              </a:ext>
+            </a:extLst>
+          </a:blip>
+          <a:srcRect t="2" r="29210" b="34622"/>
+          <a:stretch/>
+        </p:blipFill>
+        <p:spPr>
+          <a:xfrm>
+            <a:off x="609600" y="1600200"/>
+            <a:ext cx="8131010" cy="4572000"/>
+          </a:xfrm>
+        </p:spPr>
+      </p:pic>
     </p:spTree>
   </p:cSld>
   <p:clrMapOvr>

</xml_diff>